<commit_message>
more UI touch screen
</commit_message>
<xml_diff>
--- a/ESP32/T-HMI/shadow_buttons.pptx
+++ b/ESP32/T-HMI/shadow_buttons.pptx
@@ -241,7 +241,7 @@
           <a:p>
             <a:fld id="{EF30BD5C-3066-8345-81E7-CFA18801ABFB}" type="datetimeFigureOut">
               <a:rPr lang="en-US"/>
-              <a:t>9/29/24</a:t>
+              <a:t>9/30/24</a:t>
             </a:fld>
             <a:endParaRPr lang="en-US"/>
           </a:p>
@@ -409,7 +409,7 @@
           <a:p>
             <a:fld id="{EF30BD5C-3066-8345-81E7-CFA18801ABFB}" type="datetimeFigureOut">
               <a:rPr lang="en-US"/>
-              <a:t>9/29/24</a:t>
+              <a:t>9/30/24</a:t>
             </a:fld>
             <a:endParaRPr lang="en-US"/>
           </a:p>
@@ -587,7 +587,7 @@
           <a:p>
             <a:fld id="{EF30BD5C-3066-8345-81E7-CFA18801ABFB}" type="datetimeFigureOut">
               <a:rPr lang="en-US"/>
-              <a:t>9/29/24</a:t>
+              <a:t>9/30/24</a:t>
             </a:fld>
             <a:endParaRPr lang="en-US"/>
           </a:p>
@@ -755,7 +755,7 @@
           <a:p>
             <a:fld id="{EF30BD5C-3066-8345-81E7-CFA18801ABFB}" type="datetimeFigureOut">
               <a:rPr lang="en-US"/>
-              <a:t>9/29/24</a:t>
+              <a:t>9/30/24</a:t>
             </a:fld>
             <a:endParaRPr lang="en-US"/>
           </a:p>
@@ -1000,7 +1000,7 @@
           <a:p>
             <a:fld id="{EF30BD5C-3066-8345-81E7-CFA18801ABFB}" type="datetimeFigureOut">
               <a:rPr lang="en-US"/>
-              <a:t>9/29/24</a:t>
+              <a:t>9/30/24</a:t>
             </a:fld>
             <a:endParaRPr lang="en-US"/>
           </a:p>
@@ -1229,7 +1229,7 @@
           <a:p>
             <a:fld id="{EF30BD5C-3066-8345-81E7-CFA18801ABFB}" type="datetimeFigureOut">
               <a:rPr lang="en-US"/>
-              <a:t>9/29/24</a:t>
+              <a:t>9/30/24</a:t>
             </a:fld>
             <a:endParaRPr lang="en-US"/>
           </a:p>
@@ -1593,7 +1593,7 @@
           <a:p>
             <a:fld id="{EF30BD5C-3066-8345-81E7-CFA18801ABFB}" type="datetimeFigureOut">
               <a:rPr lang="en-US"/>
-              <a:t>9/29/24</a:t>
+              <a:t>9/30/24</a:t>
             </a:fld>
             <a:endParaRPr lang="en-US"/>
           </a:p>
@@ -1710,7 +1710,7 @@
           <a:p>
             <a:fld id="{EF30BD5C-3066-8345-81E7-CFA18801ABFB}" type="datetimeFigureOut">
               <a:rPr lang="en-US"/>
-              <a:t>9/29/24</a:t>
+              <a:t>9/30/24</a:t>
             </a:fld>
             <a:endParaRPr lang="en-US"/>
           </a:p>
@@ -1805,7 +1805,7 @@
           <a:p>
             <a:fld id="{EF30BD5C-3066-8345-81E7-CFA18801ABFB}" type="datetimeFigureOut">
               <a:rPr lang="en-US"/>
-              <a:t>9/29/24</a:t>
+              <a:t>9/30/24</a:t>
             </a:fld>
             <a:endParaRPr lang="en-US"/>
           </a:p>
@@ -2080,7 +2080,7 @@
           <a:p>
             <a:fld id="{EF30BD5C-3066-8345-81E7-CFA18801ABFB}" type="datetimeFigureOut">
               <a:rPr lang="en-US"/>
-              <a:t>9/29/24</a:t>
+              <a:t>9/30/24</a:t>
             </a:fld>
             <a:endParaRPr lang="en-US"/>
           </a:p>
@@ -2335,7 +2335,7 @@
           <a:p>
             <a:fld id="{EF30BD5C-3066-8345-81E7-CFA18801ABFB}" type="datetimeFigureOut">
               <a:rPr lang="en-US"/>
-              <a:t>9/29/24</a:t>
+              <a:t>9/30/24</a:t>
             </a:fld>
             <a:endParaRPr lang="en-US"/>
           </a:p>
@@ -2546,7 +2546,7 @@
           <a:p>
             <a:fld id="{EF30BD5C-3066-8345-81E7-CFA18801ABFB}" type="datetimeFigureOut">
               <a:rPr lang="en-US"/>
-              <a:t>9/29/24</a:t>
+              <a:t>9/30/24</a:t>
             </a:fld>
             <a:endParaRPr lang="en-US"/>
           </a:p>
@@ -3111,10 +3111,8 @@
                 </a:schemeClr>
               </a:gs>
             </a:gsLst>
-            <a:path path="circle">
-              <a:fillToRect l="100000" t="100000"/>
-            </a:path>
-            <a:tileRect r="-100000" b="-100000"/>
+            <a:lin ang="2700000" scaled="1"/>
+            <a:tileRect/>
           </a:gradFill>
           <a:ln w="76200">
             <a:noFill/>
@@ -3179,7 +3177,7 @@
         </p:nvSpPr>
         <p:spPr>
           <a:xfrm>
-            <a:off x="877113" y="515587"/>
+            <a:off x="1612883" y="1268158"/>
             <a:ext cx="1035220" cy="584775"/>
           </a:xfrm>
           <a:prstGeom prst="rect">
@@ -3203,6 +3201,53 @@
                 <a:cs typeface="Krungthep" panose="02000400000000000000" pitchFamily="2" charset="-34"/>
               </a:rPr>
               <a:t>LOG</a:t>
+            </a:r>
+          </a:p>
+        </p:txBody>
+      </p:sp>
+      <p:sp>
+        <p:nvSpPr>
+          <p:cNvPr id="3" name="TextBox 2">
+            <a:extLst>
+              <a:ext uri="{FF2B5EF4-FFF2-40B4-BE49-F238E27FC236}">
+                <a16:creationId xmlns:a16="http://schemas.microsoft.com/office/drawing/2014/main" id="{B60EDDB3-52FE-368E-55D0-31837BB21729}"/>
+              </a:ext>
+            </a:extLst>
+          </p:cNvPr>
+          <p:cNvSpPr txBox="1"/>
+          <p:nvPr/>
+        </p:nvSpPr>
+        <p:spPr>
+          <a:xfrm>
+            <a:off x="4064794" y="1268158"/>
+            <a:ext cx="3699033" cy="1200329"/>
+          </a:xfrm>
+          <a:prstGeom prst="rect">
+            <a:avLst/>
+          </a:prstGeom>
+          <a:noFill/>
+        </p:spPr>
+        <p:txBody>
+          <a:bodyPr wrap="square" rtlCol="0">
+            <a:spAutoFit/>
+          </a:bodyPr>
+          <a:lstStyle/>
+          <a:p>
+            <a:r>
+              <a:rPr lang="en-US"/>
+              <a:t>Change the outer ring to green</a:t>
+            </a:r>
+          </a:p>
+          <a:p>
+            <a:r>
+              <a:rPr lang="en-US"/>
+              <a:t>Central shape – toggle gradient fill from linear to rectangular </a:t>
+            </a:r>
+          </a:p>
+          <a:p>
+            <a:r>
+              <a:rPr lang="en-US"/>
+              <a:t>Export png to 720 / 450</a:t>
             </a:r>
           </a:p>
         </p:txBody>

</xml_diff>